<commit_message>
new templates for assn 8
</commit_message>
<xml_diff>
--- a/lectures/infrastructure-week-7-midterm.pptx
+++ b/lectures/infrastructure-week-7-midterm.pptx
@@ -243,7 +243,7 @@
           <a:p>
             <a:fld id="{EC4EA31E-8F8E-874E-8707-EA6F71849ACC}" type="datetimeFigureOut">
               <a:rPr lang="en-US" smtClean="0"/>
-              <a:t>3/11/18</a:t>
+              <a:t>10/21/18</a:t>
             </a:fld>
             <a:endParaRPr lang="en-US"/>
           </a:p>
@@ -408,7 +408,7 @@
           <a:p>
             <a:fld id="{EC4EA31E-8F8E-874E-8707-EA6F71849ACC}" type="datetimeFigureOut">
               <a:rPr lang="en-US" smtClean="0"/>
-              <a:t>3/11/18</a:t>
+              <a:t>10/21/18</a:t>
             </a:fld>
             <a:endParaRPr lang="en-US"/>
           </a:p>
@@ -583,7 +583,7 @@
           <a:p>
             <a:fld id="{EC4EA31E-8F8E-874E-8707-EA6F71849ACC}" type="datetimeFigureOut">
               <a:rPr lang="en-US" smtClean="0"/>
-              <a:t>3/11/18</a:t>
+              <a:t>10/21/18</a:t>
             </a:fld>
             <a:endParaRPr lang="en-US"/>
           </a:p>
@@ -748,7 +748,7 @@
           <a:p>
             <a:fld id="{EC4EA31E-8F8E-874E-8707-EA6F71849ACC}" type="datetimeFigureOut">
               <a:rPr lang="en-US" smtClean="0"/>
-              <a:t>3/11/18</a:t>
+              <a:t>10/21/18</a:t>
             </a:fld>
             <a:endParaRPr lang="en-US"/>
           </a:p>
@@ -989,7 +989,7 @@
           <a:p>
             <a:fld id="{EC4EA31E-8F8E-874E-8707-EA6F71849ACC}" type="datetimeFigureOut">
               <a:rPr lang="en-US" smtClean="0"/>
-              <a:t>3/11/18</a:t>
+              <a:t>10/21/18</a:t>
             </a:fld>
             <a:endParaRPr lang="en-US"/>
           </a:p>
@@ -1216,7 +1216,7 @@
           <a:p>
             <a:fld id="{EC4EA31E-8F8E-874E-8707-EA6F71849ACC}" type="datetimeFigureOut">
               <a:rPr lang="en-US" smtClean="0"/>
-              <a:t>3/11/18</a:t>
+              <a:t>10/21/18</a:t>
             </a:fld>
             <a:endParaRPr lang="en-US"/>
           </a:p>
@@ -1578,7 +1578,7 @@
           <a:p>
             <a:fld id="{EC4EA31E-8F8E-874E-8707-EA6F71849ACC}" type="datetimeFigureOut">
               <a:rPr lang="en-US" smtClean="0"/>
-              <a:t>3/11/18</a:t>
+              <a:t>10/21/18</a:t>
             </a:fld>
             <a:endParaRPr lang="en-US"/>
           </a:p>
@@ -1691,7 +1691,7 @@
           <a:p>
             <a:fld id="{EC4EA31E-8F8E-874E-8707-EA6F71849ACC}" type="datetimeFigureOut">
               <a:rPr lang="en-US" smtClean="0"/>
-              <a:t>3/11/18</a:t>
+              <a:t>10/21/18</a:t>
             </a:fld>
             <a:endParaRPr lang="en-US"/>
           </a:p>
@@ -1781,7 +1781,7 @@
           <a:p>
             <a:fld id="{EC4EA31E-8F8E-874E-8707-EA6F71849ACC}" type="datetimeFigureOut">
               <a:rPr lang="en-US" smtClean="0"/>
-              <a:t>3/11/18</a:t>
+              <a:t>10/21/18</a:t>
             </a:fld>
             <a:endParaRPr lang="en-US"/>
           </a:p>
@@ -2053,7 +2053,7 @@
           <a:p>
             <a:fld id="{EC4EA31E-8F8E-874E-8707-EA6F71849ACC}" type="datetimeFigureOut">
               <a:rPr lang="en-US" smtClean="0"/>
-              <a:t>3/11/18</a:t>
+              <a:t>10/21/18</a:t>
             </a:fld>
             <a:endParaRPr lang="en-US"/>
           </a:p>
@@ -2305,7 +2305,7 @@
           <a:p>
             <a:fld id="{EC4EA31E-8F8E-874E-8707-EA6F71849ACC}" type="datetimeFigureOut">
               <a:rPr lang="en-US" smtClean="0"/>
-              <a:t>3/11/18</a:t>
+              <a:t>10/21/18</a:t>
             </a:fld>
             <a:endParaRPr lang="en-US"/>
           </a:p>
@@ -2513,7 +2513,7 @@
           <a:p>
             <a:fld id="{EC4EA31E-8F8E-874E-8707-EA6F71849ACC}" type="datetimeFigureOut">
               <a:rPr lang="en-US" smtClean="0"/>
-              <a:t>3/11/18</a:t>
+              <a:t>10/21/18</a:t>
             </a:fld>
             <a:endParaRPr lang="en-US"/>
           </a:p>
@@ -2979,19 +2979,9 @@
         </p:spPr>
         <p:txBody>
           <a:bodyPr>
-            <a:normAutofit fontScale="92500" lnSpcReduction="10000"/>
+            <a:normAutofit/>
           </a:bodyPr>
           <a:lstStyle/>
-          <a:p>
-            <a:pPr marL="342900" indent="-342900" algn="l">
-              <a:buFont typeface="Arial" charset="0"/>
-              <a:buChar char="•"/>
-            </a:pPr>
-            <a:r>
-              <a:rPr lang="en-US" dirty="0"/>
-              <a:t>Please complete Midterm survey.</a:t>
-            </a:r>
-          </a:p>
           <a:p>
             <a:pPr marL="342900" indent="-342900" algn="l">
               <a:buFont typeface="Arial" charset="0"/>
@@ -3023,7 +3013,7 @@
             </a:pPr>
             <a:r>
               <a:rPr lang="en-US" dirty="0"/>
-              <a:t>The challenge ends at 9PM. No submissions accepted after this time. Budget your time wisely!</a:t>
+              <a:t>The challenge ends at 9PM. No submissions accepted after this time. Plan to begin submitting your work around 8:30PM.</a:t>
             </a:r>
           </a:p>
           <a:p>
@@ -3057,16 +3047,13 @@
             </a:pPr>
             <a:r>
               <a:rPr lang="en-US" dirty="0"/>
-              <a:t>Scoring is completely based on the artifacts </a:t>
-            </a:r>
-            <a:r>
-              <a:rPr lang="en-US"/>
-              <a:t>in your </a:t>
-            </a:r>
-            <a:r>
-              <a:rPr lang="en-US" dirty="0"/>
-              <a:t>GitHub submission. </a:t>
-            </a:r>
+              <a:t>You must submit your work </a:t>
+            </a:r>
+            <a:r>
+              <a:rPr lang="en-US"/>
+              <a:t>via GitHub. </a:t>
+            </a:r>
+            <a:endParaRPr lang="en-US" dirty="0"/>
           </a:p>
           <a:p>
             <a:pPr marL="342900" indent="-342900" algn="l">

</xml_diff>